<commit_message>
Changed slides for presentation.
</commit_message>
<xml_diff>
--- a/slides/Portfolio01_Slides.pptx
+++ b/slides/Portfolio01_Slides.pptx
@@ -127,6 +127,80 @@
 </p:presentation>
 </file>
 
+<file path=ppt/changesInfos/changesInfo1.xml><?xml version="1.0" encoding="utf-8"?>
+<pc:chgInfo xmlns:a="http://schemas.openxmlformats.org/drawingml/2006/main" xmlns:r="http://schemas.openxmlformats.org/officeDocument/2006/relationships" xmlns:ac="http://schemas.microsoft.com/office/drawing/2013/main/command" xmlns:pc="http://schemas.microsoft.com/office/powerpoint/2013/main/command">
+  <pc:docChgLst>
+    <pc:chgData name="jan.rupp06@web.de" userId="a588deeef81be32c" providerId="LiveId" clId="{0B39692B-5A29-40BD-B8D5-6B4BAF748FE9}"/>
+    <pc:docChg chg="custSel modSld">
+      <pc:chgData name="jan.rupp06@web.de" userId="a588deeef81be32c" providerId="LiveId" clId="{0B39692B-5A29-40BD-B8D5-6B4BAF748FE9}" dt="2023-06-11T19:50:43.977" v="11" actId="20577"/>
+      <pc:docMkLst>
+        <pc:docMk/>
+      </pc:docMkLst>
+      <pc:sldChg chg="modSp mod">
+        <pc:chgData name="jan.rupp06@web.de" userId="a588deeef81be32c" providerId="LiveId" clId="{0B39692B-5A29-40BD-B8D5-6B4BAF748FE9}" dt="2023-06-11T19:50:06.469" v="3" actId="20577"/>
+        <pc:sldMkLst>
+          <pc:docMk/>
+          <pc:sldMk cId="3599502142" sldId="264"/>
+        </pc:sldMkLst>
+        <pc:spChg chg="mod">
+          <ac:chgData name="jan.rupp06@web.de" userId="a588deeef81be32c" providerId="LiveId" clId="{0B39692B-5A29-40BD-B8D5-6B4BAF748FE9}" dt="2023-06-11T19:50:06.469" v="3" actId="20577"/>
+          <ac:spMkLst>
+            <pc:docMk/>
+            <pc:sldMk cId="3599502142" sldId="264"/>
+            <ac:spMk id="4" creationId="{C4F38619-03B1-BDE0-8F19-E22DAE407EF3}"/>
+          </ac:spMkLst>
+        </pc:spChg>
+      </pc:sldChg>
+      <pc:sldChg chg="delSp mod">
+        <pc:chgData name="jan.rupp06@web.de" userId="a588deeef81be32c" providerId="LiveId" clId="{0B39692B-5A29-40BD-B8D5-6B4BAF748FE9}" dt="2023-06-11T19:48:42.574" v="0" actId="478"/>
+        <pc:sldMkLst>
+          <pc:docMk/>
+          <pc:sldMk cId="3607743640" sldId="267"/>
+        </pc:sldMkLst>
+        <pc:spChg chg="del">
+          <ac:chgData name="jan.rupp06@web.de" userId="a588deeef81be32c" providerId="LiveId" clId="{0B39692B-5A29-40BD-B8D5-6B4BAF748FE9}" dt="2023-06-11T19:48:42.574" v="0" actId="478"/>
+          <ac:spMkLst>
+            <pc:docMk/>
+            <pc:sldMk cId="3607743640" sldId="267"/>
+            <ac:spMk id="3" creationId="{00000000-0000-0000-0000-000000000000}"/>
+          </ac:spMkLst>
+        </pc:spChg>
+      </pc:sldChg>
+      <pc:sldChg chg="modSp mod">
+        <pc:chgData name="jan.rupp06@web.de" userId="a588deeef81be32c" providerId="LiveId" clId="{0B39692B-5A29-40BD-B8D5-6B4BAF748FE9}" dt="2023-06-11T19:50:43.977" v="11" actId="20577"/>
+        <pc:sldMkLst>
+          <pc:docMk/>
+          <pc:sldMk cId="3790645095" sldId="268"/>
+        </pc:sldMkLst>
+        <pc:spChg chg="mod">
+          <ac:chgData name="jan.rupp06@web.de" userId="a588deeef81be32c" providerId="LiveId" clId="{0B39692B-5A29-40BD-B8D5-6B4BAF748FE9}" dt="2023-06-11T19:50:43.977" v="11" actId="20577"/>
+          <ac:spMkLst>
+            <pc:docMk/>
+            <pc:sldMk cId="3790645095" sldId="268"/>
+            <ac:spMk id="4" creationId="{9D1ECE94-05FA-CAEB-3F10-9A547D023E47}"/>
+          </ac:spMkLst>
+        </pc:spChg>
+      </pc:sldChg>
+      <pc:sldChg chg="modSp mod">
+        <pc:chgData name="jan.rupp06@web.de" userId="a588deeef81be32c" providerId="LiveId" clId="{0B39692B-5A29-40BD-B8D5-6B4BAF748FE9}" dt="2023-06-11T19:50:29.538" v="9" actId="27636"/>
+        <pc:sldMkLst>
+          <pc:docMk/>
+          <pc:sldMk cId="1899832215" sldId="273"/>
+        </pc:sldMkLst>
+        <pc:spChg chg="mod">
+          <ac:chgData name="jan.rupp06@web.de" userId="a588deeef81be32c" providerId="LiveId" clId="{0B39692B-5A29-40BD-B8D5-6B4BAF748FE9}" dt="2023-06-11T19:50:29.538" v="9" actId="27636"/>
+          <ac:spMkLst>
+            <pc:docMk/>
+            <pc:sldMk cId="1899832215" sldId="273"/>
+            <ac:spMk id="4" creationId="{E04189B0-3DB0-1313-9C40-60F451098045}"/>
+          </ac:spMkLst>
+        </pc:spChg>
+      </pc:sldChg>
+    </pc:docChg>
+  </pc:docChgLst>
+</pc:chgInfo>
+</file>
+
 <file path=ppt/notesMasters/notesMaster1.xml><?xml version="1.0" encoding="utf-8"?>
 <p:notesMaster xmlns:a="http://schemas.openxmlformats.org/drawingml/2006/main" xmlns:r="http://schemas.openxmlformats.org/officeDocument/2006/relationships" xmlns:p="http://schemas.openxmlformats.org/presentationml/2006/main">
   <p:cSld>
@@ -209,7 +283,7 @@
           <a:p>
             <a:fld id="{AA8CB6A2-A5B3-4899-A434-641E1099C74E}" type="datetimeFigureOut">
               <a:rPr lang="de-DE" smtClean="0"/>
-              <a:t>02.06.2023</a:t>
+              <a:t>11.06.2023</a:t>
             </a:fld>
             <a:endParaRPr lang="de-DE"/>
           </a:p>
@@ -1124,7 +1198,7 @@
           </a:lstStyle>
           <a:p>
             <a:r>
-              <a:rPr lang="de-DE" smtClean="0"/>
+              <a:rPr lang="de-DE"/>
               <a:t>Titelmasterformat durch Klicken bearbeiten</a:t>
             </a:r>
             <a:endParaRPr lang="en-US" dirty="0"/>
@@ -1196,7 +1270,7 @@
           </a:lstStyle>
           <a:p>
             <a:r>
-              <a:rPr lang="de-DE" smtClean="0"/>
+              <a:rPr lang="de-DE"/>
               <a:t>Formatvorlage des Untertitelmasters durch Klicken bearbeiten</a:t>
             </a:r>
             <a:endParaRPr lang="en-US" dirty="0"/>
@@ -1220,7 +1294,7 @@
           <a:p>
             <a:fld id="{C4141A18-4352-4597-AFD8-BECC62423707}" type="datetimeFigureOut">
               <a:rPr lang="de-DE" smtClean="0"/>
-              <a:t>02.06.2023</a:t>
+              <a:t>11.06.2023</a:t>
             </a:fld>
             <a:endParaRPr lang="de-DE"/>
           </a:p>
@@ -1352,7 +1426,7 @@
           <a:lstStyle/>
           <a:p>
             <a:r>
-              <a:rPr lang="de-DE" smtClean="0"/>
+              <a:rPr lang="de-DE"/>
               <a:t>Titelmasterformat durch Klicken bearbeiten</a:t>
             </a:r>
             <a:endParaRPr lang="en-US" dirty="0"/>
@@ -1376,35 +1450,35 @@
           <a:p>
             <a:pPr lvl="0"/>
             <a:r>
-              <a:rPr lang="de-DE" smtClean="0"/>
+              <a:rPr lang="de-DE"/>
               <a:t>Textmasterformat bearbeiten</a:t>
             </a:r>
           </a:p>
           <a:p>
             <a:pPr lvl="1"/>
             <a:r>
-              <a:rPr lang="de-DE" smtClean="0"/>
+              <a:rPr lang="de-DE"/>
               <a:t>Zweite Ebene</a:t>
             </a:r>
           </a:p>
           <a:p>
             <a:pPr lvl="2"/>
             <a:r>
-              <a:rPr lang="de-DE" smtClean="0"/>
+              <a:rPr lang="de-DE"/>
               <a:t>Dritte Ebene</a:t>
             </a:r>
           </a:p>
           <a:p>
             <a:pPr lvl="3"/>
             <a:r>
-              <a:rPr lang="de-DE" smtClean="0"/>
+              <a:rPr lang="de-DE"/>
               <a:t>Vierte Ebene</a:t>
             </a:r>
           </a:p>
           <a:p>
             <a:pPr lvl="4"/>
             <a:r>
-              <a:rPr lang="de-DE" smtClean="0"/>
+              <a:rPr lang="de-DE"/>
               <a:t>Fünfte Ebene</a:t>
             </a:r>
             <a:endParaRPr lang="en-US" dirty="0"/>
@@ -1428,7 +1502,7 @@
           <a:p>
             <a:fld id="{C4141A18-4352-4597-AFD8-BECC62423707}" type="datetimeFigureOut">
               <a:rPr lang="de-DE" smtClean="0"/>
-              <a:t>02.06.2023</a:t>
+              <a:t>11.06.2023</a:t>
             </a:fld>
             <a:endParaRPr lang="de-DE"/>
           </a:p>
@@ -1603,7 +1677,7 @@
           <a:lstStyle/>
           <a:p>
             <a:r>
-              <a:rPr lang="de-DE" smtClean="0"/>
+              <a:rPr lang="de-DE"/>
               <a:t>Titelmasterformat durch Klicken bearbeiten</a:t>
             </a:r>
             <a:endParaRPr lang="en-US" dirty="0"/>
@@ -1632,35 +1706,35 @@
           <a:p>
             <a:pPr lvl="0"/>
             <a:r>
-              <a:rPr lang="de-DE" smtClean="0"/>
+              <a:rPr lang="de-DE"/>
               <a:t>Textmasterformat bearbeiten</a:t>
             </a:r>
           </a:p>
           <a:p>
             <a:pPr lvl="1"/>
             <a:r>
-              <a:rPr lang="de-DE" smtClean="0"/>
+              <a:rPr lang="de-DE"/>
               <a:t>Zweite Ebene</a:t>
             </a:r>
           </a:p>
           <a:p>
             <a:pPr lvl="2"/>
             <a:r>
-              <a:rPr lang="de-DE" smtClean="0"/>
+              <a:rPr lang="de-DE"/>
               <a:t>Dritte Ebene</a:t>
             </a:r>
           </a:p>
           <a:p>
             <a:pPr lvl="3"/>
             <a:r>
-              <a:rPr lang="de-DE" smtClean="0"/>
+              <a:rPr lang="de-DE"/>
               <a:t>Vierte Ebene</a:t>
             </a:r>
           </a:p>
           <a:p>
             <a:pPr lvl="4"/>
             <a:r>
-              <a:rPr lang="de-DE" smtClean="0"/>
+              <a:rPr lang="de-DE"/>
               <a:t>Fünfte Ebene</a:t>
             </a:r>
             <a:endParaRPr lang="en-US" dirty="0"/>
@@ -1684,7 +1758,7 @@
           <a:p>
             <a:fld id="{C4141A18-4352-4597-AFD8-BECC62423707}" type="datetimeFigureOut">
               <a:rPr lang="de-DE" smtClean="0"/>
-              <a:t>02.06.2023</a:t>
+              <a:t>11.06.2023</a:t>
             </a:fld>
             <a:endParaRPr lang="de-DE"/>
           </a:p>
@@ -1778,7 +1852,7 @@
           <a:lstStyle/>
           <a:p>
             <a:r>
-              <a:rPr lang="de-DE" smtClean="0"/>
+              <a:rPr lang="de-DE"/>
               <a:t>Titelmasterformat durch Klicken bearbeiten</a:t>
             </a:r>
             <a:endParaRPr lang="en-US" dirty="0"/>
@@ -1802,35 +1876,35 @@
           <a:p>
             <a:pPr lvl="0"/>
             <a:r>
-              <a:rPr lang="de-DE" smtClean="0"/>
+              <a:rPr lang="de-DE"/>
               <a:t>Textmasterformat bearbeiten</a:t>
             </a:r>
           </a:p>
           <a:p>
             <a:pPr lvl="1"/>
             <a:r>
-              <a:rPr lang="de-DE" smtClean="0"/>
+              <a:rPr lang="de-DE"/>
               <a:t>Zweite Ebene</a:t>
             </a:r>
           </a:p>
           <a:p>
             <a:pPr lvl="2"/>
             <a:r>
-              <a:rPr lang="de-DE" smtClean="0"/>
+              <a:rPr lang="de-DE"/>
               <a:t>Dritte Ebene</a:t>
             </a:r>
           </a:p>
           <a:p>
             <a:pPr lvl="3"/>
             <a:r>
-              <a:rPr lang="de-DE" smtClean="0"/>
+              <a:rPr lang="de-DE"/>
               <a:t>Vierte Ebene</a:t>
             </a:r>
           </a:p>
           <a:p>
             <a:pPr lvl="4"/>
             <a:r>
-              <a:rPr lang="de-DE" smtClean="0"/>
+              <a:rPr lang="de-DE"/>
               <a:t>Fünfte Ebene</a:t>
             </a:r>
             <a:endParaRPr lang="en-US" dirty="0"/>
@@ -1854,7 +1928,7 @@
           <a:p>
             <a:fld id="{C4141A18-4352-4597-AFD8-BECC62423707}" type="datetimeFigureOut">
               <a:rPr lang="de-DE" smtClean="0"/>
-              <a:t>02.06.2023</a:t>
+              <a:t>11.06.2023</a:t>
             </a:fld>
             <a:endParaRPr lang="de-DE"/>
           </a:p>
@@ -2053,7 +2127,7 @@
           </a:lstStyle>
           <a:p>
             <a:r>
-              <a:rPr lang="de-DE" smtClean="0"/>
+              <a:rPr lang="de-DE"/>
               <a:t>Titelmasterformat durch Klicken bearbeiten</a:t>
             </a:r>
             <a:endParaRPr lang="en-US" dirty="0"/>
@@ -2174,7 +2248,7 @@
           <a:p>
             <a:pPr lvl="0"/>
             <a:r>
-              <a:rPr lang="de-DE" smtClean="0"/>
+              <a:rPr lang="de-DE"/>
               <a:t>Textmasterformat bearbeiten</a:t>
             </a:r>
           </a:p>
@@ -2197,7 +2271,7 @@
           <a:p>
             <a:fld id="{C4141A18-4352-4597-AFD8-BECC62423707}" type="datetimeFigureOut">
               <a:rPr lang="de-DE" smtClean="0"/>
-              <a:t>02.06.2023</a:t>
+              <a:t>11.06.2023</a:t>
             </a:fld>
             <a:endParaRPr lang="de-DE"/>
           </a:p>
@@ -2334,7 +2408,7 @@
           <a:lstStyle/>
           <a:p>
             <a:r>
-              <a:rPr lang="de-DE" smtClean="0"/>
+              <a:rPr lang="de-DE"/>
               <a:t>Titelmasterformat durch Klicken bearbeiten</a:t>
             </a:r>
             <a:endParaRPr lang="en-US" dirty="0"/>
@@ -2363,35 +2437,35 @@
           <a:p>
             <a:pPr lvl="0"/>
             <a:r>
-              <a:rPr lang="de-DE" smtClean="0"/>
+              <a:rPr lang="de-DE"/>
               <a:t>Textmasterformat bearbeiten</a:t>
             </a:r>
           </a:p>
           <a:p>
             <a:pPr lvl="1"/>
             <a:r>
-              <a:rPr lang="de-DE" smtClean="0"/>
+              <a:rPr lang="de-DE"/>
               <a:t>Zweite Ebene</a:t>
             </a:r>
           </a:p>
           <a:p>
             <a:pPr lvl="2"/>
             <a:r>
-              <a:rPr lang="de-DE" smtClean="0"/>
+              <a:rPr lang="de-DE"/>
               <a:t>Dritte Ebene</a:t>
             </a:r>
           </a:p>
           <a:p>
             <a:pPr lvl="3"/>
             <a:r>
-              <a:rPr lang="de-DE" smtClean="0"/>
+              <a:rPr lang="de-DE"/>
               <a:t>Vierte Ebene</a:t>
             </a:r>
           </a:p>
           <a:p>
             <a:pPr lvl="4"/>
             <a:r>
-              <a:rPr lang="de-DE" smtClean="0"/>
+              <a:rPr lang="de-DE"/>
               <a:t>Fünfte Ebene</a:t>
             </a:r>
             <a:endParaRPr lang="en-US" dirty="0"/>
@@ -2420,35 +2494,35 @@
           <a:p>
             <a:pPr lvl="0"/>
             <a:r>
-              <a:rPr lang="de-DE" smtClean="0"/>
+              <a:rPr lang="de-DE"/>
               <a:t>Textmasterformat bearbeiten</a:t>
             </a:r>
           </a:p>
           <a:p>
             <a:pPr lvl="1"/>
             <a:r>
-              <a:rPr lang="de-DE" smtClean="0"/>
+              <a:rPr lang="de-DE"/>
               <a:t>Zweite Ebene</a:t>
             </a:r>
           </a:p>
           <a:p>
             <a:pPr lvl="2"/>
             <a:r>
-              <a:rPr lang="de-DE" smtClean="0"/>
+              <a:rPr lang="de-DE"/>
               <a:t>Dritte Ebene</a:t>
             </a:r>
           </a:p>
           <a:p>
             <a:pPr lvl="3"/>
             <a:r>
-              <a:rPr lang="de-DE" smtClean="0"/>
+              <a:rPr lang="de-DE"/>
               <a:t>Vierte Ebene</a:t>
             </a:r>
           </a:p>
           <a:p>
             <a:pPr lvl="4"/>
             <a:r>
-              <a:rPr lang="de-DE" smtClean="0"/>
+              <a:rPr lang="de-DE"/>
               <a:t>Fünfte Ebene</a:t>
             </a:r>
             <a:endParaRPr lang="en-US" dirty="0"/>
@@ -2472,7 +2546,7 @@
           <a:p>
             <a:fld id="{C4141A18-4352-4597-AFD8-BECC62423707}" type="datetimeFigureOut">
               <a:rPr lang="de-DE" smtClean="0"/>
-              <a:t>02.06.2023</a:t>
+              <a:t>11.06.2023</a:t>
             </a:fld>
             <a:endParaRPr lang="de-DE"/>
           </a:p>
@@ -2571,7 +2645,7 @@
           <a:lstStyle/>
           <a:p>
             <a:r>
-              <a:rPr lang="de-DE" smtClean="0"/>
+              <a:rPr lang="de-DE"/>
               <a:t>Titelmasterformat durch Klicken bearbeiten</a:t>
             </a:r>
             <a:endParaRPr lang="en-US" dirty="0"/>
@@ -2643,7 +2717,7 @@
           <a:p>
             <a:pPr lvl="0"/>
             <a:r>
-              <a:rPr lang="de-DE" smtClean="0"/>
+              <a:rPr lang="de-DE"/>
               <a:t>Textmasterformat bearbeiten</a:t>
             </a:r>
           </a:p>
@@ -2671,35 +2745,35 @@
           <a:p>
             <a:pPr lvl="0"/>
             <a:r>
-              <a:rPr lang="de-DE" smtClean="0"/>
+              <a:rPr lang="de-DE"/>
               <a:t>Textmasterformat bearbeiten</a:t>
             </a:r>
           </a:p>
           <a:p>
             <a:pPr lvl="1"/>
             <a:r>
-              <a:rPr lang="de-DE" smtClean="0"/>
+              <a:rPr lang="de-DE"/>
               <a:t>Zweite Ebene</a:t>
             </a:r>
           </a:p>
           <a:p>
             <a:pPr lvl="2"/>
             <a:r>
-              <a:rPr lang="de-DE" smtClean="0"/>
+              <a:rPr lang="de-DE"/>
               <a:t>Dritte Ebene</a:t>
             </a:r>
           </a:p>
           <a:p>
             <a:pPr lvl="3"/>
             <a:r>
-              <a:rPr lang="de-DE" smtClean="0"/>
+              <a:rPr lang="de-DE"/>
               <a:t>Vierte Ebene</a:t>
             </a:r>
           </a:p>
           <a:p>
             <a:pPr lvl="4"/>
             <a:r>
-              <a:rPr lang="de-DE" smtClean="0"/>
+              <a:rPr lang="de-DE"/>
               <a:t>Fünfte Ebene</a:t>
             </a:r>
             <a:endParaRPr lang="en-US" dirty="0"/>
@@ -2771,7 +2845,7 @@
           <a:p>
             <a:pPr lvl="0"/>
             <a:r>
-              <a:rPr lang="de-DE" smtClean="0"/>
+              <a:rPr lang="de-DE"/>
               <a:t>Textmasterformat bearbeiten</a:t>
             </a:r>
           </a:p>
@@ -2799,35 +2873,35 @@
           <a:p>
             <a:pPr lvl="0"/>
             <a:r>
-              <a:rPr lang="de-DE" smtClean="0"/>
+              <a:rPr lang="de-DE"/>
               <a:t>Textmasterformat bearbeiten</a:t>
             </a:r>
           </a:p>
           <a:p>
             <a:pPr lvl="1"/>
             <a:r>
-              <a:rPr lang="de-DE" smtClean="0"/>
+              <a:rPr lang="de-DE"/>
               <a:t>Zweite Ebene</a:t>
             </a:r>
           </a:p>
           <a:p>
             <a:pPr lvl="2"/>
             <a:r>
-              <a:rPr lang="de-DE" smtClean="0"/>
+              <a:rPr lang="de-DE"/>
               <a:t>Dritte Ebene</a:t>
             </a:r>
           </a:p>
           <a:p>
             <a:pPr lvl="3"/>
             <a:r>
-              <a:rPr lang="de-DE" smtClean="0"/>
+              <a:rPr lang="de-DE"/>
               <a:t>Vierte Ebene</a:t>
             </a:r>
           </a:p>
           <a:p>
             <a:pPr lvl="4"/>
             <a:r>
-              <a:rPr lang="de-DE" smtClean="0"/>
+              <a:rPr lang="de-DE"/>
               <a:t>Fünfte Ebene</a:t>
             </a:r>
             <a:endParaRPr lang="en-US" dirty="0"/>
@@ -2851,7 +2925,7 @@
           <a:p>
             <a:fld id="{C4141A18-4352-4597-AFD8-BECC62423707}" type="datetimeFigureOut">
               <a:rPr lang="de-DE" smtClean="0"/>
-              <a:t>02.06.2023</a:t>
+              <a:t>11.06.2023</a:t>
             </a:fld>
             <a:endParaRPr lang="de-DE"/>
           </a:p>
@@ -2945,7 +3019,7 @@
           <a:lstStyle/>
           <a:p>
             <a:r>
-              <a:rPr lang="de-DE" smtClean="0"/>
+              <a:rPr lang="de-DE"/>
               <a:t>Titelmasterformat durch Klicken bearbeiten</a:t>
             </a:r>
             <a:endParaRPr lang="en-US" dirty="0"/>
@@ -2969,7 +3043,7 @@
           <a:p>
             <a:fld id="{C4141A18-4352-4597-AFD8-BECC62423707}" type="datetimeFigureOut">
               <a:rPr lang="de-DE" smtClean="0"/>
-              <a:t>02.06.2023</a:t>
+              <a:t>11.06.2023</a:t>
             </a:fld>
             <a:endParaRPr lang="de-DE"/>
           </a:p>
@@ -3140,7 +3214,7 @@
           <a:p>
             <a:fld id="{C4141A18-4352-4597-AFD8-BECC62423707}" type="datetimeFigureOut">
               <a:rPr lang="de-DE" smtClean="0"/>
-              <a:t>02.06.2023</a:t>
+              <a:t>11.06.2023</a:t>
             </a:fld>
             <a:endParaRPr lang="de-DE"/>
           </a:p>
@@ -3333,7 +3407,7 @@
           </a:lstStyle>
           <a:p>
             <a:r>
-              <a:rPr lang="de-DE" smtClean="0"/>
+              <a:rPr lang="de-DE"/>
               <a:t>Titelmasterformat durch Klicken bearbeiten</a:t>
             </a:r>
             <a:endParaRPr lang="en-US" dirty="0"/>
@@ -3362,35 +3436,35 @@
           <a:p>
             <a:pPr lvl="0"/>
             <a:r>
-              <a:rPr lang="de-DE" smtClean="0"/>
+              <a:rPr lang="de-DE"/>
               <a:t>Textmasterformat bearbeiten</a:t>
             </a:r>
           </a:p>
           <a:p>
             <a:pPr lvl="1"/>
             <a:r>
-              <a:rPr lang="de-DE" smtClean="0"/>
+              <a:rPr lang="de-DE"/>
               <a:t>Zweite Ebene</a:t>
             </a:r>
           </a:p>
           <a:p>
             <a:pPr lvl="2"/>
             <a:r>
-              <a:rPr lang="de-DE" smtClean="0"/>
+              <a:rPr lang="de-DE"/>
               <a:t>Dritte Ebene</a:t>
             </a:r>
           </a:p>
           <a:p>
             <a:pPr lvl="3"/>
             <a:r>
-              <a:rPr lang="de-DE" smtClean="0"/>
+              <a:rPr lang="de-DE"/>
               <a:t>Vierte Ebene</a:t>
             </a:r>
           </a:p>
           <a:p>
             <a:pPr lvl="4"/>
             <a:r>
-              <a:rPr lang="de-DE" smtClean="0"/>
+              <a:rPr lang="de-DE"/>
               <a:t>Fünfte Ebene</a:t>
             </a:r>
             <a:endParaRPr lang="en-US" dirty="0"/>
@@ -3462,7 +3536,7 @@
           <a:p>
             <a:pPr lvl="0"/>
             <a:r>
-              <a:rPr lang="de-DE" smtClean="0"/>
+              <a:rPr lang="de-DE"/>
               <a:t>Textmasterformat bearbeiten</a:t>
             </a:r>
           </a:p>
@@ -3494,7 +3568,7 @@
           <a:p>
             <a:fld id="{C4141A18-4352-4597-AFD8-BECC62423707}" type="datetimeFigureOut">
               <a:rPr lang="de-DE" smtClean="0"/>
-              <a:t>02.06.2023</a:t>
+              <a:t>11.06.2023</a:t>
             </a:fld>
             <a:endParaRPr lang="de-DE"/>
           </a:p>
@@ -3700,7 +3774,7 @@
           </a:lstStyle>
           <a:p>
             <a:r>
-              <a:rPr lang="de-DE" smtClean="0"/>
+              <a:rPr lang="de-DE"/>
               <a:t>Titelmasterformat durch Klicken bearbeiten</a:t>
             </a:r>
             <a:endParaRPr lang="en-US" dirty="0"/>
@@ -3770,7 +3844,7 @@
           </a:lstStyle>
           <a:p>
             <a:r>
-              <a:rPr lang="de-DE" smtClean="0"/>
+              <a:rPr lang="de-DE"/>
               <a:t>Bild durch Klicken auf Symbol hinzufügen</a:t>
             </a:r>
             <a:endParaRPr lang="en-US" dirty="0"/>
@@ -3848,7 +3922,7 @@
           <a:p>
             <a:pPr lvl="0"/>
             <a:r>
-              <a:rPr lang="de-DE" smtClean="0"/>
+              <a:rPr lang="de-DE"/>
               <a:t>Textmasterformat bearbeiten</a:t>
             </a:r>
           </a:p>
@@ -3871,7 +3945,7 @@
           <a:p>
             <a:fld id="{C4141A18-4352-4597-AFD8-BECC62423707}" type="datetimeFigureOut">
               <a:rPr lang="de-DE" smtClean="0"/>
-              <a:t>02.06.2023</a:t>
+              <a:t>11.06.2023</a:t>
             </a:fld>
             <a:endParaRPr lang="de-DE"/>
           </a:p>
@@ -4056,7 +4130,7 @@
           <a:lstStyle/>
           <a:p>
             <a:r>
-              <a:rPr lang="de-DE" smtClean="0"/>
+              <a:rPr lang="de-DE"/>
               <a:t>Titelmasterformat durch Klicken bearbeiten</a:t>
             </a:r>
             <a:endParaRPr lang="en-US" dirty="0"/>
@@ -4090,35 +4164,35 @@
           <a:p>
             <a:pPr lvl="0"/>
             <a:r>
-              <a:rPr lang="de-DE" smtClean="0"/>
+              <a:rPr lang="de-DE"/>
               <a:t>Textmasterformat bearbeiten</a:t>
             </a:r>
           </a:p>
           <a:p>
             <a:pPr lvl="1"/>
             <a:r>
-              <a:rPr lang="de-DE" smtClean="0"/>
+              <a:rPr lang="de-DE"/>
               <a:t>Zweite Ebene</a:t>
             </a:r>
           </a:p>
           <a:p>
             <a:pPr lvl="2"/>
             <a:r>
-              <a:rPr lang="de-DE" smtClean="0"/>
+              <a:rPr lang="de-DE"/>
               <a:t>Dritte Ebene</a:t>
             </a:r>
           </a:p>
           <a:p>
             <a:pPr lvl="3"/>
             <a:r>
-              <a:rPr lang="de-DE" smtClean="0"/>
+              <a:rPr lang="de-DE"/>
               <a:t>Vierte Ebene</a:t>
             </a:r>
           </a:p>
           <a:p>
             <a:pPr lvl="4"/>
             <a:r>
-              <a:rPr lang="de-DE" smtClean="0"/>
+              <a:rPr lang="de-DE"/>
               <a:t>Fünfte Ebene</a:t>
             </a:r>
             <a:endParaRPr lang="en-US" dirty="0"/>
@@ -4158,7 +4232,7 @@
           <a:p>
             <a:fld id="{C4141A18-4352-4597-AFD8-BECC62423707}" type="datetimeFigureOut">
               <a:rPr lang="de-DE" smtClean="0"/>
-              <a:t>02.06.2023</a:t>
+              <a:t>11.06.2023</a:t>
             </a:fld>
             <a:endParaRPr lang="de-DE"/>
           </a:p>
@@ -4687,7 +4761,7 @@
           <p:cNvPr id="2" name="Titel 1">
             <a:extLst>
               <a:ext uri="{FF2B5EF4-FFF2-40B4-BE49-F238E27FC236}">
-                <a16:creationId xmlns:a16="http://schemas.microsoft.com/office/drawing/2014/main" xmlns="" id="{3FFFECB4-827B-2C8D-5469-5BE65CD2FC92}"/>
+                <a16:creationId xmlns:a16="http://schemas.microsoft.com/office/drawing/2014/main" id="{3FFFECB4-827B-2C8D-5469-5BE65CD2FC92}"/>
               </a:ext>
             </a:extLst>
           </p:cNvPr>
@@ -4715,7 +4789,7 @@
           <p:cNvPr id="3" name="Untertitel 2">
             <a:extLst>
               <a:ext uri="{FF2B5EF4-FFF2-40B4-BE49-F238E27FC236}">
-                <a16:creationId xmlns:a16="http://schemas.microsoft.com/office/drawing/2014/main" xmlns="" id="{31BC26FC-10CC-0CE7-6E54-CD50658EA4BD}"/>
+                <a16:creationId xmlns:a16="http://schemas.microsoft.com/office/drawing/2014/main" id="{31BC26FC-10CC-0CE7-6E54-CD50658EA4BD}"/>
               </a:ext>
             </a:extLst>
           </p:cNvPr>
@@ -4779,7 +4853,7 @@
           <p:cNvPr id="2" name="Titel 1">
             <a:extLst>
               <a:ext uri="{FF2B5EF4-FFF2-40B4-BE49-F238E27FC236}">
-                <a16:creationId xmlns:a16="http://schemas.microsoft.com/office/drawing/2014/main" xmlns="" id="{2B12611C-97F0-82E0-1497-D1FFEE0DADA0}"/>
+                <a16:creationId xmlns:a16="http://schemas.microsoft.com/office/drawing/2014/main" id="{2B12611C-97F0-82E0-1497-D1FFEE0DADA0}"/>
               </a:ext>
             </a:extLst>
           </p:cNvPr>
@@ -4807,7 +4881,7 @@
           <p:cNvPr id="4" name="Textplatzhalter 3">
             <a:extLst>
               <a:ext uri="{FF2B5EF4-FFF2-40B4-BE49-F238E27FC236}">
-                <a16:creationId xmlns:a16="http://schemas.microsoft.com/office/drawing/2014/main" xmlns="" id="{00041F69-5064-FA6F-567A-A03D23EB9ABB}"/>
+                <a16:creationId xmlns:a16="http://schemas.microsoft.com/office/drawing/2014/main" id="{00041F69-5064-FA6F-567A-A03D23EB9ABB}"/>
               </a:ext>
             </a:extLst>
           </p:cNvPr>
@@ -4869,17 +4943,12 @@
             </a:pPr>
             <a:r>
               <a:rPr lang="de-DE" sz="1800" dirty="0"/>
-              <a:t>Falls die Elemente weit genug hinter der Kamera sind, werden diese aus der Gruppe </a:t>
-            </a:r>
-            <a:r>
-              <a:rPr lang="de-DE" sz="1800" dirty="0" smtClean="0"/>
-              <a:t>entfernt</a:t>
-            </a:r>
-            <a:r>
-              <a:rPr lang="de-DE" sz="1600" dirty="0" smtClean="0"/>
+              <a:t>Falls die Elemente weit genug hinter der Kamera sind, werden diese aus der Gruppe entfernt</a:t>
+            </a:r>
+            <a:r>
+              <a:rPr lang="de-DE" sz="1600" dirty="0"/>
               <a:t>.</a:t>
             </a:r>
-            <a:endParaRPr lang="de-DE" sz="1600" dirty="0"/>
           </a:p>
         </p:txBody>
       </p:sp>
@@ -4942,7 +5011,7 @@
           <p:cNvPr id="2" name="Titel 1">
             <a:extLst>
               <a:ext uri="{FF2B5EF4-FFF2-40B4-BE49-F238E27FC236}">
-                <a16:creationId xmlns:a16="http://schemas.microsoft.com/office/drawing/2014/main" xmlns="" id="{CAA03FC0-31DF-9F63-961D-9997DDF3CA14}"/>
+                <a16:creationId xmlns:a16="http://schemas.microsoft.com/office/drawing/2014/main" id="{CAA03FC0-31DF-9F63-961D-9997DDF3CA14}"/>
               </a:ext>
             </a:extLst>
           </p:cNvPr>
@@ -4970,7 +5039,7 @@
           <p:cNvPr id="3" name="Inhaltsplatzhalter 2">
             <a:extLst>
               <a:ext uri="{FF2B5EF4-FFF2-40B4-BE49-F238E27FC236}">
-                <a16:creationId xmlns:a16="http://schemas.microsoft.com/office/drawing/2014/main" xmlns="" id="{37A5B4AA-D93B-A26A-D893-BA507A2758AB}"/>
+                <a16:creationId xmlns:a16="http://schemas.microsoft.com/office/drawing/2014/main" id="{37A5B4AA-D93B-A26A-D893-BA507A2758AB}"/>
               </a:ext>
             </a:extLst>
           </p:cNvPr>
@@ -5096,7 +5165,7 @@
           <p:cNvPr id="2" name="Titel 1">
             <a:extLst>
               <a:ext uri="{FF2B5EF4-FFF2-40B4-BE49-F238E27FC236}">
-                <a16:creationId xmlns:a16="http://schemas.microsoft.com/office/drawing/2014/main" xmlns="" id="{A90F4A71-8F7D-10A7-C29E-F3FCD96E8778}"/>
+                <a16:creationId xmlns:a16="http://schemas.microsoft.com/office/drawing/2014/main" id="{A90F4A71-8F7D-10A7-C29E-F3FCD96E8778}"/>
               </a:ext>
             </a:extLst>
           </p:cNvPr>
@@ -5129,7 +5198,7 @@
           <p:cNvPr id="3" name="Inhaltsplatzhalter 2">
             <a:extLst>
               <a:ext uri="{FF2B5EF4-FFF2-40B4-BE49-F238E27FC236}">
-                <a16:creationId xmlns:a16="http://schemas.microsoft.com/office/drawing/2014/main" xmlns="" id="{9C39594A-A392-68D6-5C22-4046703762BB}"/>
+                <a16:creationId xmlns:a16="http://schemas.microsoft.com/office/drawing/2014/main" id="{9C39594A-A392-68D6-5C22-4046703762BB}"/>
               </a:ext>
             </a:extLst>
           </p:cNvPr>
@@ -5221,7 +5290,7 @@
           <p:cNvPr id="2" name="Titel 1">
             <a:extLst>
               <a:ext uri="{FF2B5EF4-FFF2-40B4-BE49-F238E27FC236}">
-                <a16:creationId xmlns:a16="http://schemas.microsoft.com/office/drawing/2014/main" xmlns="" id="{47FA62A9-319C-EEE5-1780-85CD0C578017}"/>
+                <a16:creationId xmlns:a16="http://schemas.microsoft.com/office/drawing/2014/main" id="{47FA62A9-319C-EEE5-1780-85CD0C578017}"/>
               </a:ext>
             </a:extLst>
           </p:cNvPr>
@@ -5249,7 +5318,7 @@
           <p:cNvPr id="3" name="Inhaltsplatzhalter 2">
             <a:extLst>
               <a:ext uri="{FF2B5EF4-FFF2-40B4-BE49-F238E27FC236}">
-                <a16:creationId xmlns:a16="http://schemas.microsoft.com/office/drawing/2014/main" xmlns="" id="{5091DB7F-9328-3E71-E79B-50D3AB832DB5}"/>
+                <a16:creationId xmlns:a16="http://schemas.microsoft.com/office/drawing/2014/main" id="{5091DB7F-9328-3E71-E79B-50D3AB832DB5}"/>
               </a:ext>
             </a:extLst>
           </p:cNvPr>
@@ -5297,13 +5366,8 @@
             <a:pPr lvl="1"/>
             <a:r>
               <a:rPr lang="de-DE" sz="2000" dirty="0"/>
-              <a:t>Fokus auf die </a:t>
-            </a:r>
-            <a:r>
-              <a:rPr lang="de-DE" sz="2000" dirty="0" smtClean="0"/>
-              <a:t>Kugeln</a:t>
-            </a:r>
-            <a:endParaRPr lang="de-DE" sz="2000" dirty="0"/>
+              <a:t>Fokus auf die Kugeln</a:t>
+            </a:r>
           </a:p>
           <a:p>
             <a:r>
@@ -5345,7 +5409,7 @@
           <p:cNvPr id="5" name="Grafik 4" descr="Ein Bild, das Text, Muster, Quadrat, Screenshot enthält.&#10;&#10;Automatisch generierte Beschreibung">
             <a:extLst>
               <a:ext uri="{FF2B5EF4-FFF2-40B4-BE49-F238E27FC236}">
-                <a16:creationId xmlns:a16="http://schemas.microsoft.com/office/drawing/2014/main" xmlns="" id="{EA3AC4A0-7AC7-ED1E-23AF-22BFB6B96BA9}"/>
+                <a16:creationId xmlns:a16="http://schemas.microsoft.com/office/drawing/2014/main" id="{EA3AC4A0-7AC7-ED1E-23AF-22BFB6B96BA9}"/>
               </a:ext>
             </a:extLst>
           </p:cNvPr>
@@ -5411,7 +5475,7 @@
           <p:cNvPr id="2" name="Titel 1">
             <a:extLst>
               <a:ext uri="{FF2B5EF4-FFF2-40B4-BE49-F238E27FC236}">
-                <a16:creationId xmlns:a16="http://schemas.microsoft.com/office/drawing/2014/main" xmlns="" id="{0C083BD7-20DB-2B2A-24A8-BDDD70A08F66}"/>
+                <a16:creationId xmlns:a16="http://schemas.microsoft.com/office/drawing/2014/main" id="{0C083BD7-20DB-2B2A-24A8-BDDD70A08F66}"/>
               </a:ext>
             </a:extLst>
           </p:cNvPr>
@@ -5439,7 +5503,7 @@
           <p:cNvPr id="3" name="Inhaltsplatzhalter 2">
             <a:extLst>
               <a:ext uri="{FF2B5EF4-FFF2-40B4-BE49-F238E27FC236}">
-                <a16:creationId xmlns:a16="http://schemas.microsoft.com/office/drawing/2014/main" xmlns="" id="{1892E5EF-3C09-A536-1067-AC914468537A}"/>
+                <a16:creationId xmlns:a16="http://schemas.microsoft.com/office/drawing/2014/main" id="{1892E5EF-3C09-A536-1067-AC914468537A}"/>
               </a:ext>
             </a:extLst>
           </p:cNvPr>
@@ -5558,7 +5622,7 @@
           <p:cNvPr id="2" name="Titel 1">
             <a:extLst>
               <a:ext uri="{FF2B5EF4-FFF2-40B4-BE49-F238E27FC236}">
-                <a16:creationId xmlns:a16="http://schemas.microsoft.com/office/drawing/2014/main" xmlns="" id="{D4B15AD6-94CE-2A11-0E3C-E9B99F1E8FA8}"/>
+                <a16:creationId xmlns:a16="http://schemas.microsoft.com/office/drawing/2014/main" id="{D4B15AD6-94CE-2A11-0E3C-E9B99F1E8FA8}"/>
               </a:ext>
             </a:extLst>
           </p:cNvPr>
@@ -5586,7 +5650,7 @@
           <p:cNvPr id="3" name="Untertitel 2">
             <a:extLst>
               <a:ext uri="{FF2B5EF4-FFF2-40B4-BE49-F238E27FC236}">
-                <a16:creationId xmlns:a16="http://schemas.microsoft.com/office/drawing/2014/main" xmlns="" id="{49466385-C784-DE67-66B9-BF80942B2240}"/>
+                <a16:creationId xmlns:a16="http://schemas.microsoft.com/office/drawing/2014/main" id="{49466385-C784-DE67-66B9-BF80942B2240}"/>
               </a:ext>
             </a:extLst>
           </p:cNvPr>
@@ -5644,7 +5708,7 @@
           <p:cNvPr id="2" name="Titel 1">
             <a:extLst>
               <a:ext uri="{FF2B5EF4-FFF2-40B4-BE49-F238E27FC236}">
-                <a16:creationId xmlns:a16="http://schemas.microsoft.com/office/drawing/2014/main" xmlns="" id="{0B95B175-38D2-495B-288B-C52DCA446FD4}"/>
+                <a16:creationId xmlns:a16="http://schemas.microsoft.com/office/drawing/2014/main" id="{0B95B175-38D2-495B-288B-C52DCA446FD4}"/>
               </a:ext>
             </a:extLst>
           </p:cNvPr>
@@ -5672,7 +5736,7 @@
           <p:cNvPr id="3" name="Textplatzhalter 2">
             <a:extLst>
               <a:ext uri="{FF2B5EF4-FFF2-40B4-BE49-F238E27FC236}">
-                <a16:creationId xmlns:a16="http://schemas.microsoft.com/office/drawing/2014/main" xmlns="" id="{A33EF481-764C-A9E1-1408-393A0695AF23}"/>
+                <a16:creationId xmlns:a16="http://schemas.microsoft.com/office/drawing/2014/main" id="{A33EF481-764C-A9E1-1408-393A0695AF23}"/>
               </a:ext>
             </a:extLst>
           </p:cNvPr>
@@ -5700,7 +5764,7 @@
           <p:cNvPr id="15" name="Inhaltsplatzhalter 14">
             <a:extLst>
               <a:ext uri="{FF2B5EF4-FFF2-40B4-BE49-F238E27FC236}">
-                <a16:creationId xmlns:a16="http://schemas.microsoft.com/office/drawing/2014/main" xmlns="" id="{D8C3C021-6049-FC71-7C75-7941F6B19031}"/>
+                <a16:creationId xmlns:a16="http://schemas.microsoft.com/office/drawing/2014/main" id="{D8C3C021-6049-FC71-7C75-7941F6B19031}"/>
               </a:ext>
             </a:extLst>
           </p:cNvPr>
@@ -5729,7 +5793,7 @@
           <p:cNvPr id="5" name="Textplatzhalter 4">
             <a:extLst>
               <a:ext uri="{FF2B5EF4-FFF2-40B4-BE49-F238E27FC236}">
-                <a16:creationId xmlns:a16="http://schemas.microsoft.com/office/drawing/2014/main" xmlns="" id="{BB2A4663-1B37-006F-795A-F3516C3A78AC}"/>
+                <a16:creationId xmlns:a16="http://schemas.microsoft.com/office/drawing/2014/main" id="{BB2A4663-1B37-006F-795A-F3516C3A78AC}"/>
               </a:ext>
             </a:extLst>
           </p:cNvPr>
@@ -5773,7 +5837,7 @@
           <p:cNvPr id="12" name="Inhaltsplatzhalter 11" descr="Ein Bild, das Spiele, Hallensportarten, Screenshot, Text enthält.">
             <a:extLst>
               <a:ext uri="{FF2B5EF4-FFF2-40B4-BE49-F238E27FC236}">
-                <a16:creationId xmlns:a16="http://schemas.microsoft.com/office/drawing/2014/main" xmlns="" id="{25A69D20-8546-B4E5-D39B-681E989D2269}"/>
+                <a16:creationId xmlns:a16="http://schemas.microsoft.com/office/drawing/2014/main" id="{25A69D20-8546-B4E5-D39B-681E989D2269}"/>
               </a:ext>
             </a:extLst>
           </p:cNvPr>
@@ -5808,7 +5872,7 @@
           <p:cNvPr id="13" name="Textfeld 12">
             <a:extLst>
               <a:ext uri="{FF2B5EF4-FFF2-40B4-BE49-F238E27FC236}">
-                <a16:creationId xmlns:a16="http://schemas.microsoft.com/office/drawing/2014/main" xmlns="" id="{4DD7BB02-407C-4CEF-14F4-193C15853E31}"/>
+                <a16:creationId xmlns:a16="http://schemas.microsoft.com/office/drawing/2014/main" id="{4DD7BB02-407C-4CEF-14F4-193C15853E31}"/>
               </a:ext>
             </a:extLst>
           </p:cNvPr>
@@ -5877,7 +5941,7 @@
           <p:cNvPr id="2" name="Titel 1">
             <a:extLst>
               <a:ext uri="{FF2B5EF4-FFF2-40B4-BE49-F238E27FC236}">
-                <a16:creationId xmlns:a16="http://schemas.microsoft.com/office/drawing/2014/main" xmlns="" id="{73377BEF-0C5A-3E9E-561B-DEFEFC73DE3D}"/>
+                <a16:creationId xmlns:a16="http://schemas.microsoft.com/office/drawing/2014/main" id="{73377BEF-0C5A-3E9E-561B-DEFEFC73DE3D}"/>
               </a:ext>
             </a:extLst>
           </p:cNvPr>
@@ -5905,7 +5969,7 @@
           <p:cNvPr id="5" name="Inhaltsplatzhalter 4">
             <a:extLst>
               <a:ext uri="{FF2B5EF4-FFF2-40B4-BE49-F238E27FC236}">
-                <a16:creationId xmlns:a16="http://schemas.microsoft.com/office/drawing/2014/main" xmlns="" id="{025B05BF-B420-36F4-F6C5-2DEBC077407F}"/>
+                <a16:creationId xmlns:a16="http://schemas.microsoft.com/office/drawing/2014/main" id="{025B05BF-B420-36F4-F6C5-2DEBC077407F}"/>
               </a:ext>
             </a:extLst>
           </p:cNvPr>
@@ -5964,7 +6028,7 @@
           <p:cNvPr id="2" name="Titel 1">
             <a:extLst>
               <a:ext uri="{FF2B5EF4-FFF2-40B4-BE49-F238E27FC236}">
-                <a16:creationId xmlns:a16="http://schemas.microsoft.com/office/drawing/2014/main" xmlns="" id="{BFE2AECC-2E61-B4AE-40C6-9090E23BF3BC}"/>
+                <a16:creationId xmlns:a16="http://schemas.microsoft.com/office/drawing/2014/main" id="{BFE2AECC-2E61-B4AE-40C6-9090E23BF3BC}"/>
               </a:ext>
             </a:extLst>
           </p:cNvPr>
@@ -5992,7 +6056,7 @@
           <p:cNvPr id="4" name="Textplatzhalter 3">
             <a:extLst>
               <a:ext uri="{FF2B5EF4-FFF2-40B4-BE49-F238E27FC236}">
-                <a16:creationId xmlns:a16="http://schemas.microsoft.com/office/drawing/2014/main" xmlns="" id="{C4F38619-03B1-BDE0-8F19-E22DAE407EF3}"/>
+                <a16:creationId xmlns:a16="http://schemas.microsoft.com/office/drawing/2014/main" id="{C4F38619-03B1-BDE0-8F19-E22DAE407EF3}"/>
               </a:ext>
             </a:extLst>
           </p:cNvPr>
@@ -6019,7 +6083,7 @@
             </a:pPr>
             <a:r>
               <a:rPr lang="de-DE" sz="1800" dirty="0"/>
-              <a:t>Landschaftselemente werden in einer Gruppe gespeichert</a:t>
+              <a:t>Landschaftselemente werden in einer Gruppe gespeichert.</a:t>
             </a:r>
           </a:p>
           <a:p>
@@ -6058,7 +6122,7 @@
             </a:pPr>
             <a:r>
               <a:rPr lang="de-DE" sz="1800" dirty="0"/>
-              <a:t>Für jede Landschaft werden 10 rote Kugeln erstellt</a:t>
+              <a:t>Für jede Landschaft werden 10 rote Kugeln erstellt.</a:t>
             </a:r>
           </a:p>
           <a:p>
@@ -6075,7 +6139,7 @@
                   <a:schemeClr val="bg1"/>
                 </a:solidFill>
               </a:rPr>
-              <a:t>Radius, X- und Z- Koordinaten werden zufällig bestimmt</a:t>
+              <a:t>Radius, X- und Z- Koordinaten werden zufällig bestimmt.</a:t>
             </a:r>
           </a:p>
           <a:p>
@@ -6088,7 +6152,7 @@
           <p:cNvPr id="10" name="Grafik 9">
             <a:extLst>
               <a:ext uri="{FF2B5EF4-FFF2-40B4-BE49-F238E27FC236}">
-                <a16:creationId xmlns:a16="http://schemas.microsoft.com/office/drawing/2014/main" xmlns="" id="{C80419C8-2154-3B7E-495C-8FEEF86DBA52}"/>
+                <a16:creationId xmlns:a16="http://schemas.microsoft.com/office/drawing/2014/main" id="{C80419C8-2154-3B7E-495C-8FEEF86DBA52}"/>
               </a:ext>
             </a:extLst>
           </p:cNvPr>
@@ -6148,7 +6212,7 @@
           <p:cNvPr id="2" name="Titel 1">
             <a:extLst>
               <a:ext uri="{FF2B5EF4-FFF2-40B4-BE49-F238E27FC236}">
-                <a16:creationId xmlns:a16="http://schemas.microsoft.com/office/drawing/2014/main" xmlns="" id="{545D0D62-B21D-A055-6614-7B03445E0D92}"/>
+                <a16:creationId xmlns:a16="http://schemas.microsoft.com/office/drawing/2014/main" id="{545D0D62-B21D-A055-6614-7B03445E0D92}"/>
               </a:ext>
             </a:extLst>
           </p:cNvPr>
@@ -6177,7 +6241,7 @@
           <p:cNvPr id="4" name="Textplatzhalter 3">
             <a:extLst>
               <a:ext uri="{FF2B5EF4-FFF2-40B4-BE49-F238E27FC236}">
-                <a16:creationId xmlns:a16="http://schemas.microsoft.com/office/drawing/2014/main" xmlns="" id="{E04189B0-3DB0-1313-9C40-60F451098045}"/>
+                <a16:creationId xmlns:a16="http://schemas.microsoft.com/office/drawing/2014/main" id="{E04189B0-3DB0-1313-9C40-60F451098045}"/>
               </a:ext>
             </a:extLst>
           </p:cNvPr>
@@ -6191,7 +6255,7 @@
         <p:spPr/>
         <p:txBody>
           <a:bodyPr>
-            <a:normAutofit/>
+            <a:normAutofit fontScale="85000" lnSpcReduction="10000"/>
           </a:bodyPr>
           <a:lstStyle/>
           <a:p>
@@ -6203,7 +6267,7 @@
               <a:buChar char="•"/>
             </a:pPr>
             <a:r>
-              <a:rPr lang="de-DE" dirty="0"/>
+              <a:rPr lang="de-DE" sz="2400" dirty="0"/>
               <a:t>Fokus nur auf die Kugeln</a:t>
             </a:r>
           </a:p>
@@ -6216,7 +6280,7 @@
               <a:buChar char="•"/>
             </a:pPr>
             <a:r>
-              <a:rPr lang="de-DE" dirty="0"/>
+              <a:rPr lang="de-DE" sz="2400" dirty="0"/>
               <a:t>Test, ob die Kugel hinzugefügt werden soll.</a:t>
             </a:r>
           </a:p>
@@ -6229,7 +6293,7 @@
               <a:buChar char="•"/>
             </a:pPr>
             <a:r>
-              <a:rPr lang="de-DE" dirty="0"/>
+              <a:rPr lang="de-DE" sz="2400" dirty="0"/>
               <a:t>Den passenden Index herausfinden.</a:t>
             </a:r>
           </a:p>
@@ -6242,7 +6306,7 @@
               <a:buChar char="•"/>
             </a:pPr>
             <a:r>
-              <a:rPr lang="de-DE" dirty="0"/>
+              <a:rPr lang="de-DE" sz="2400" dirty="0"/>
               <a:t>Objekt wird dann in der Liste des Knotens hinzugefügt.</a:t>
             </a:r>
           </a:p>
@@ -6255,7 +6319,7 @@
               <a:buChar char="•"/>
             </a:pPr>
             <a:r>
-              <a:rPr lang="de-DE" dirty="0"/>
+              <a:rPr lang="de-DE" sz="2400" dirty="0"/>
               <a:t>Verkleinerung der Liste (falls möglich)</a:t>
             </a:r>
           </a:p>
@@ -6280,7 +6344,7 @@
           <p:cNvPr id="5" name="Grafik 4">
             <a:extLst>
               <a:ext uri="{FF2B5EF4-FFF2-40B4-BE49-F238E27FC236}">
-                <a16:creationId xmlns:a16="http://schemas.microsoft.com/office/drawing/2014/main" xmlns="" id="{43ABC439-1E06-5605-1CD4-29DA3DBE3730}"/>
+                <a16:creationId xmlns:a16="http://schemas.microsoft.com/office/drawing/2014/main" id="{43ABC439-1E06-5605-1CD4-29DA3DBE3730}"/>
               </a:ext>
             </a:extLst>
           </p:cNvPr>
@@ -6340,7 +6404,7 @@
           <p:cNvPr id="2" name="Titel 1">
             <a:extLst>
               <a:ext uri="{FF2B5EF4-FFF2-40B4-BE49-F238E27FC236}">
-                <a16:creationId xmlns:a16="http://schemas.microsoft.com/office/drawing/2014/main" xmlns="" id="{545D0D62-B21D-A055-6614-7B03445E0D92}"/>
+                <a16:creationId xmlns:a16="http://schemas.microsoft.com/office/drawing/2014/main" id="{545D0D62-B21D-A055-6614-7B03445E0D92}"/>
               </a:ext>
             </a:extLst>
           </p:cNvPr>
@@ -6366,29 +6430,10 @@
       </p:sp>
       <p:sp>
         <p:nvSpPr>
-          <p:cNvPr id="3" name="Inhaltsplatzhalter 2"/>
-          <p:cNvSpPr>
-            <a:spLocks noGrp="1"/>
-          </p:cNvSpPr>
-          <p:nvPr>
-            <p:ph idx="1"/>
-          </p:nvPr>
-        </p:nvSpPr>
-        <p:spPr/>
-        <p:txBody>
-          <a:bodyPr/>
-          <a:lstStyle/>
-          <a:p>
-            <a:endParaRPr lang="de-DE"/>
-          </a:p>
-        </p:txBody>
-      </p:sp>
-      <p:sp>
-        <p:nvSpPr>
           <p:cNvPr id="4" name="Textplatzhalter 3">
             <a:extLst>
               <a:ext uri="{FF2B5EF4-FFF2-40B4-BE49-F238E27FC236}">
-                <a16:creationId xmlns:a16="http://schemas.microsoft.com/office/drawing/2014/main" xmlns="" id="{E04189B0-3DB0-1313-9C40-60F451098045}"/>
+                <a16:creationId xmlns:a16="http://schemas.microsoft.com/office/drawing/2014/main" id="{E04189B0-3DB0-1313-9C40-60F451098045}"/>
               </a:ext>
             </a:extLst>
           </p:cNvPr>
@@ -6559,7 +6604,7 @@
           <p:cNvPr id="10" name="Grafik 9">
             <a:extLst>
               <a:ext uri="{FF2B5EF4-FFF2-40B4-BE49-F238E27FC236}">
-                <a16:creationId xmlns:a16="http://schemas.microsoft.com/office/drawing/2014/main" xmlns="" id="{F70A7A6B-6C90-00A3-F0DA-965E7E82EF7A}"/>
+                <a16:creationId xmlns:a16="http://schemas.microsoft.com/office/drawing/2014/main" id="{F70A7A6B-6C90-00A3-F0DA-965E7E82EF7A}"/>
               </a:ext>
             </a:extLst>
           </p:cNvPr>
@@ -6619,7 +6664,7 @@
           <p:cNvPr id="2" name="Titel 1">
             <a:extLst>
               <a:ext uri="{FF2B5EF4-FFF2-40B4-BE49-F238E27FC236}">
-                <a16:creationId xmlns:a16="http://schemas.microsoft.com/office/drawing/2014/main" xmlns="" id="{7B516826-9303-4D9D-5880-AAC88D6B1861}"/>
+                <a16:creationId xmlns:a16="http://schemas.microsoft.com/office/drawing/2014/main" id="{7B516826-9303-4D9D-5880-AAC88D6B1861}"/>
               </a:ext>
             </a:extLst>
           </p:cNvPr>
@@ -6652,7 +6697,7 @@
           <p:cNvPr id="4" name="Textplatzhalter 3">
             <a:extLst>
               <a:ext uri="{FF2B5EF4-FFF2-40B4-BE49-F238E27FC236}">
-                <a16:creationId xmlns:a16="http://schemas.microsoft.com/office/drawing/2014/main" xmlns="" id="{9D1ECE94-05FA-CAEB-3F10-9A547D023E47}"/>
+                <a16:creationId xmlns:a16="http://schemas.microsoft.com/office/drawing/2014/main" id="{9D1ECE94-05FA-CAEB-3F10-9A547D023E47}"/>
               </a:ext>
             </a:extLst>
           </p:cNvPr>
@@ -6676,12 +6721,12 @@
               <a:buChar char="•"/>
             </a:pPr>
             <a:r>
-              <a:rPr lang="de-DE" sz="1800" dirty="0">
+              <a:rPr lang="de-DE" sz="2000" dirty="0">
                 <a:solidFill>
                   <a:schemeClr val="bg1"/>
                 </a:solidFill>
               </a:rPr>
-              <a:t>Sehr einfach gehalten, da Kamer nicht bewegt werden kann.</a:t>
+              <a:t>Sehr einfach gehalten, da Kamera nicht bewegt werden kann.</a:t>
             </a:r>
           </a:p>
           <a:p>
@@ -6691,7 +6736,7 @@
               <a:buChar char="•"/>
             </a:pPr>
             <a:r>
-              <a:rPr lang="de-DE" sz="1800" dirty="0">
+              <a:rPr lang="de-DE" sz="2000" dirty="0">
                 <a:solidFill>
                   <a:schemeClr val="bg1"/>
                 </a:solidFill>
@@ -6699,7 +6744,7 @@
               <a:t>Viewing </a:t>
             </a:r>
             <a:r>
-              <a:rPr lang="de-DE" sz="1800" dirty="0" err="1">
+              <a:rPr lang="de-DE" sz="2000" dirty="0" err="1">
                 <a:solidFill>
                   <a:schemeClr val="bg1"/>
                 </a:solidFill>
@@ -6707,7 +6752,7 @@
               <a:t>Frustrum</a:t>
             </a:r>
             <a:r>
-              <a:rPr lang="de-DE" sz="1800" dirty="0">
+              <a:rPr lang="de-DE" sz="2000" dirty="0">
                 <a:solidFill>
                   <a:schemeClr val="bg1"/>
                 </a:solidFill>
@@ -6722,7 +6767,7 @@
               <a:buChar char="•"/>
             </a:pPr>
             <a:r>
-              <a:rPr lang="de-DE" sz="1800" dirty="0">
+              <a:rPr lang="de-DE" sz="2000" dirty="0">
                 <a:solidFill>
                   <a:schemeClr val="bg1"/>
                 </a:solidFill>
@@ -6730,7 +6775,7 @@
               <a:t>Test, ob eine Kugel sich vollständig im Viewing </a:t>
             </a:r>
             <a:r>
-              <a:rPr lang="de-DE" sz="1800" dirty="0" err="1">
+              <a:rPr lang="de-DE" sz="2000" dirty="0" err="1">
                 <a:solidFill>
                   <a:schemeClr val="bg1"/>
                 </a:solidFill>
@@ -6738,7 +6783,7 @@
               <a:t>Frustrum</a:t>
             </a:r>
             <a:r>
-              <a:rPr lang="de-DE" sz="1800" dirty="0">
+              <a:rPr lang="de-DE" sz="2000" dirty="0">
                 <a:solidFill>
                   <a:schemeClr val="bg1"/>
                 </a:solidFill>
@@ -6760,7 +6805,7 @@
           <p:cNvPr id="6" name="Grafik 5">
             <a:extLst>
               <a:ext uri="{FF2B5EF4-FFF2-40B4-BE49-F238E27FC236}">
-                <a16:creationId xmlns:a16="http://schemas.microsoft.com/office/drawing/2014/main" xmlns="" id="{6B6340D3-6EB0-E99F-24C1-06B91FF9410F}"/>
+                <a16:creationId xmlns:a16="http://schemas.microsoft.com/office/drawing/2014/main" id="{6B6340D3-6EB0-E99F-24C1-06B91FF9410F}"/>
               </a:ext>
             </a:extLst>
           </p:cNvPr>

</xml_diff>